<commit_message>
update DT homework week 8 part 1, 2
</commit_message>
<xml_diff>
--- a/DT_Homework/Week8/DT_week8.pptx
+++ b/DT_Homework/Week8/DT_week8.pptx
@@ -12,11 +12,11 @@
     <p:sldId id="267" r:id="rId6"/>
     <p:sldId id="260" r:id="rId7"/>
     <p:sldId id="261" r:id="rId8"/>
-    <p:sldId id="262" r:id="rId9"/>
-    <p:sldId id="263" r:id="rId10"/>
-    <p:sldId id="264" r:id="rId11"/>
-    <p:sldId id="265" r:id="rId12"/>
-    <p:sldId id="266" r:id="rId13"/>
+    <p:sldId id="263" r:id="rId9"/>
+    <p:sldId id="264" r:id="rId10"/>
+    <p:sldId id="265" r:id="rId11"/>
+    <p:sldId id="266" r:id="rId12"/>
+    <p:sldId id="268" r:id="rId13"/>
   </p:sldIdLst>
   <p:sldSz cx="12192000" cy="6858000"/>
   <p:notesSz cx="6858000" cy="9144000"/>
@@ -115,6 +115,11 @@
       </a:defRPr>
     </a:lvl9pPr>
   </p:defaultTextStyle>
+  <p:extLst>
+    <p:ext uri="{EFAFB233-063F-42B5-8137-9DF3F51BA10A}">
+      <p15:sldGuideLst xmlns:p15="http://schemas.microsoft.com/office/powerpoint/2012/main"/>
+    </p:ext>
+  </p:extLst>
 </p:presentation>
 </file>
 
@@ -249,7 +254,7 @@
           <a:p>
             <a:fld id="{D708B713-4089-450C-9640-3250AE6BF8A0}" type="datetimeFigureOut">
               <a:rPr lang="en-US" smtClean="0"/>
-              <a:t>06-Dec-19</a:t>
+              <a:t>11-Dec-19</a:t>
             </a:fld>
             <a:endParaRPr lang="en-US"/>
           </a:p>
@@ -419,7 +424,7 @@
           <a:p>
             <a:fld id="{D708B713-4089-450C-9640-3250AE6BF8A0}" type="datetimeFigureOut">
               <a:rPr lang="en-US" smtClean="0"/>
-              <a:t>06-Dec-19</a:t>
+              <a:t>11-Dec-19</a:t>
             </a:fld>
             <a:endParaRPr lang="en-US"/>
           </a:p>
@@ -599,7 +604,7 @@
           <a:p>
             <a:fld id="{D708B713-4089-450C-9640-3250AE6BF8A0}" type="datetimeFigureOut">
               <a:rPr lang="en-US" smtClean="0"/>
-              <a:t>06-Dec-19</a:t>
+              <a:t>11-Dec-19</a:t>
             </a:fld>
             <a:endParaRPr lang="en-US"/>
           </a:p>
@@ -769,7 +774,7 @@
           <a:p>
             <a:fld id="{D708B713-4089-450C-9640-3250AE6BF8A0}" type="datetimeFigureOut">
               <a:rPr lang="en-US" smtClean="0"/>
-              <a:t>06-Dec-19</a:t>
+              <a:t>11-Dec-19</a:t>
             </a:fld>
             <a:endParaRPr lang="en-US"/>
           </a:p>
@@ -1015,7 +1020,7 @@
           <a:p>
             <a:fld id="{D708B713-4089-450C-9640-3250AE6BF8A0}" type="datetimeFigureOut">
               <a:rPr lang="en-US" smtClean="0"/>
-              <a:t>06-Dec-19</a:t>
+              <a:t>11-Dec-19</a:t>
             </a:fld>
             <a:endParaRPr lang="en-US"/>
           </a:p>
@@ -1247,7 +1252,7 @@
           <a:p>
             <a:fld id="{D708B713-4089-450C-9640-3250AE6BF8A0}" type="datetimeFigureOut">
               <a:rPr lang="en-US" smtClean="0"/>
-              <a:t>06-Dec-19</a:t>
+              <a:t>11-Dec-19</a:t>
             </a:fld>
             <a:endParaRPr lang="en-US"/>
           </a:p>
@@ -1614,7 +1619,7 @@
           <a:p>
             <a:fld id="{D708B713-4089-450C-9640-3250AE6BF8A0}" type="datetimeFigureOut">
               <a:rPr lang="en-US" smtClean="0"/>
-              <a:t>06-Dec-19</a:t>
+              <a:t>11-Dec-19</a:t>
             </a:fld>
             <a:endParaRPr lang="en-US"/>
           </a:p>
@@ -1732,7 +1737,7 @@
           <a:p>
             <a:fld id="{D708B713-4089-450C-9640-3250AE6BF8A0}" type="datetimeFigureOut">
               <a:rPr lang="en-US" smtClean="0"/>
-              <a:t>06-Dec-19</a:t>
+              <a:t>11-Dec-19</a:t>
             </a:fld>
             <a:endParaRPr lang="en-US"/>
           </a:p>
@@ -1827,7 +1832,7 @@
           <a:p>
             <a:fld id="{D708B713-4089-450C-9640-3250AE6BF8A0}" type="datetimeFigureOut">
               <a:rPr lang="en-US" smtClean="0"/>
-              <a:t>06-Dec-19</a:t>
+              <a:t>11-Dec-19</a:t>
             </a:fld>
             <a:endParaRPr lang="en-US"/>
           </a:p>
@@ -2104,7 +2109,7 @@
           <a:p>
             <a:fld id="{D708B713-4089-450C-9640-3250AE6BF8A0}" type="datetimeFigureOut">
               <a:rPr lang="en-US" smtClean="0"/>
-              <a:t>06-Dec-19</a:t>
+              <a:t>11-Dec-19</a:t>
             </a:fld>
             <a:endParaRPr lang="en-US"/>
           </a:p>
@@ -2357,7 +2362,7 @@
           <a:p>
             <a:fld id="{D708B713-4089-450C-9640-3250AE6BF8A0}" type="datetimeFigureOut">
               <a:rPr lang="en-US" smtClean="0"/>
-              <a:t>06-Dec-19</a:t>
+              <a:t>11-Dec-19</a:t>
             </a:fld>
             <a:endParaRPr lang="en-US"/>
           </a:p>
@@ -2570,7 +2575,7 @@
           <a:p>
             <a:fld id="{D708B713-4089-450C-9640-3250AE6BF8A0}" type="datetimeFigureOut">
               <a:rPr lang="en-US" smtClean="0"/>
-              <a:t>06-Dec-19</a:t>
+              <a:t>11-Dec-19</a:t>
             </a:fld>
             <a:endParaRPr lang="en-US"/>
           </a:p>
@@ -3073,7 +3078,7 @@
           <a:p>
             <a:r>
               <a:rPr lang="en-US" smtClean="0"/>
-              <a:t>Subsampling 1:4 dùng nearest neighboor</a:t>
+              <a:t>Subsampling 1:4 dùng trung bình pixels</a:t>
             </a:r>
             <a:endParaRPr lang="en-US"/>
           </a:p>
@@ -3103,8 +3108,8 @@
         </p:blipFill>
         <p:spPr>
           <a:xfrm>
-            <a:off x="838200" y="1690688"/>
-            <a:ext cx="4347255" cy="4347255"/>
+            <a:off x="838199" y="1690687"/>
+            <a:ext cx="4332741" cy="4332741"/>
           </a:xfrm>
         </p:spPr>
       </p:pic>
@@ -3116,7 +3121,7 @@
         </p:nvSpPr>
         <p:spPr>
           <a:xfrm>
-            <a:off x="6836228" y="1690688"/>
+            <a:off x="6096000" y="1690687"/>
             <a:ext cx="6096000" cy="3416320"/>
           </a:xfrm>
           <a:prstGeom prst="rect">
@@ -3131,73 +3136,73 @@
           <a:p>
             <a:r>
               <a:rPr lang="en-US" smtClean="0"/>
-              <a:t>1	0	0</a:t>
-            </a:r>
-          </a:p>
-          <a:p>
-            <a:r>
-              <a:rPr lang="en-US" smtClean="0"/>
-              <a:t>0	0	0</a:t>
-            </a:r>
-          </a:p>
-          <a:p>
-            <a:r>
-              <a:rPr lang="en-US" smtClean="0"/>
-              <a:t>0	0	0</a:t>
-            </a:r>
-          </a:p>
-          <a:p>
-            <a:r>
-              <a:rPr lang="en-US" smtClean="0"/>
-              <a:t>0	0	0</a:t>
-            </a:r>
-          </a:p>
-          <a:p>
-            <a:r>
-              <a:rPr lang="en-US" smtClean="0"/>
-              <a:t>0	1	0</a:t>
-            </a:r>
-          </a:p>
-          <a:p>
-            <a:r>
-              <a:rPr lang="en-US" smtClean="0"/>
-              <a:t>0	0	0</a:t>
-            </a:r>
-          </a:p>
-          <a:p>
-            <a:r>
-              <a:rPr lang="en-US" smtClean="0"/>
-              <a:t>0	0	0</a:t>
-            </a:r>
-          </a:p>
-          <a:p>
-            <a:r>
-              <a:rPr lang="en-US" smtClean="0"/>
-              <a:t>0	0	0</a:t>
-            </a:r>
-          </a:p>
-          <a:p>
-            <a:r>
-              <a:rPr lang="en-US" smtClean="0"/>
-              <a:t>0	0	1</a:t>
-            </a:r>
-          </a:p>
-          <a:p>
-            <a:r>
-              <a:rPr lang="en-US" smtClean="0"/>
-              <a:t>0	0	0</a:t>
-            </a:r>
-          </a:p>
-          <a:p>
-            <a:r>
-              <a:rPr lang="en-US" smtClean="0"/>
-              <a:t>0	0	0</a:t>
-            </a:r>
-          </a:p>
-          <a:p>
-            <a:r>
-              <a:rPr lang="en-US" smtClean="0"/>
-              <a:t>0	0	0</a:t>
+              <a:t>0.250000000000000	0	0</a:t>
+            </a:r>
+          </a:p>
+          <a:p>
+            <a:r>
+              <a:rPr lang="en-US" smtClean="0"/>
+              <a:t>0.250000000000000	0	0</a:t>
+            </a:r>
+          </a:p>
+          <a:p>
+            <a:r>
+              <a:rPr lang="en-US" smtClean="0"/>
+              <a:t>0.250000000000000	0	0</a:t>
+            </a:r>
+          </a:p>
+          <a:p>
+            <a:r>
+              <a:rPr lang="en-US" smtClean="0"/>
+              <a:t>0.250000000000000	0	0</a:t>
+            </a:r>
+          </a:p>
+          <a:p>
+            <a:r>
+              <a:rPr lang="en-US" smtClean="0"/>
+              <a:t>0	0.250000000000000	0</a:t>
+            </a:r>
+          </a:p>
+          <a:p>
+            <a:r>
+              <a:rPr lang="en-US" smtClean="0"/>
+              <a:t>0	0.250000000000000	0</a:t>
+            </a:r>
+          </a:p>
+          <a:p>
+            <a:r>
+              <a:rPr lang="en-US" smtClean="0"/>
+              <a:t>0	0.250000000000000	0</a:t>
+            </a:r>
+          </a:p>
+          <a:p>
+            <a:r>
+              <a:rPr lang="en-US" smtClean="0"/>
+              <a:t>0	0.250000000000000	0</a:t>
+            </a:r>
+          </a:p>
+          <a:p>
+            <a:r>
+              <a:rPr lang="en-US" smtClean="0"/>
+              <a:t>0	0	0.250000000000000</a:t>
+            </a:r>
+          </a:p>
+          <a:p>
+            <a:r>
+              <a:rPr lang="en-US" smtClean="0"/>
+              <a:t>0	0	0.250000000000000</a:t>
+            </a:r>
+          </a:p>
+          <a:p>
+            <a:r>
+              <a:rPr lang="en-US" smtClean="0"/>
+              <a:t>0	0	0.250000000000000</a:t>
+            </a:r>
+          </a:p>
+          <a:p>
+            <a:r>
+              <a:rPr lang="en-US" smtClean="0"/>
+              <a:t>0	0	0.250000000000000</a:t>
             </a:r>
             <a:endParaRPr lang="en-US"/>
           </a:p>
@@ -3236,7 +3241,7 @@
     </p:spTree>
     <p:extLst>
       <p:ext uri="{BB962C8B-B14F-4D97-AF65-F5344CB8AC3E}">
-        <p14:creationId xmlns:p14="http://schemas.microsoft.com/office/powerpoint/2010/main" val="1945859918"/>
+        <p14:creationId xmlns:p14="http://schemas.microsoft.com/office/powerpoint/2010/main" val="603083048"/>
       </p:ext>
     </p:extLst>
   </p:cSld>
@@ -3280,7 +3285,101 @@
           <a:p>
             <a:r>
               <a:rPr lang="en-US" smtClean="0"/>
-              <a:t>Subsampling 1:4 dùng trung bình pixels</a:t>
+              <a:t>4. Sharpening filter</a:t>
+            </a:r>
+            <a:endParaRPr lang="en-US"/>
+          </a:p>
+        </p:txBody>
+      </p:sp>
+      <p:sp>
+        <p:nvSpPr>
+          <p:cNvPr id="6" name="TextBox 5"/>
+          <p:cNvSpPr txBox="1"/>
+          <p:nvPr/>
+        </p:nvSpPr>
+        <p:spPr>
+          <a:xfrm>
+            <a:off x="3181607" y="5268686"/>
+            <a:ext cx="852606" cy="369332"/>
+          </a:xfrm>
+          <a:prstGeom prst="rect">
+            <a:avLst/>
+          </a:prstGeom>
+          <a:noFill/>
+        </p:spPr>
+        <p:txBody>
+          <a:bodyPr wrap="none" rtlCol="0">
+            <a:spAutoFit/>
+          </a:bodyPr>
+          <a:lstStyle/>
+          <a:p>
+            <a:r>
+              <a:rPr lang="en-US" smtClean="0"/>
+              <a:t>Matlab</a:t>
+            </a:r>
+            <a:endParaRPr lang="en-US"/>
+          </a:p>
+        </p:txBody>
+      </p:sp>
+      <p:sp>
+        <p:nvSpPr>
+          <p:cNvPr id="7" name="TextBox 6"/>
+          <p:cNvSpPr txBox="1"/>
+          <p:nvPr/>
+        </p:nvSpPr>
+        <p:spPr>
+          <a:xfrm>
+            <a:off x="6331203" y="5268686"/>
+            <a:ext cx="1080104" cy="369332"/>
+          </a:xfrm>
+          <a:prstGeom prst="rect">
+            <a:avLst/>
+          </a:prstGeom>
+          <a:noFill/>
+        </p:spPr>
+        <p:txBody>
+          <a:bodyPr wrap="none" rtlCol="0">
+            <a:spAutoFit/>
+          </a:bodyPr>
+          <a:lstStyle/>
+          <a:p>
+            <a:r>
+              <a:rPr lang="en-US" smtClean="0"/>
+              <a:t>Naive DIY</a:t>
+            </a:r>
+            <a:endParaRPr lang="en-US"/>
+          </a:p>
+        </p:txBody>
+      </p:sp>
+      <p:sp>
+        <p:nvSpPr>
+          <p:cNvPr id="8" name="TextBox 7"/>
+          <p:cNvSpPr txBox="1"/>
+          <p:nvPr/>
+        </p:nvSpPr>
+        <p:spPr>
+          <a:xfrm>
+            <a:off x="9508607" y="5268686"/>
+            <a:ext cx="1265346" cy="369332"/>
+          </a:xfrm>
+          <a:prstGeom prst="rect">
+            <a:avLst/>
+          </a:prstGeom>
+          <a:noFill/>
+        </p:spPr>
+        <p:txBody>
+          <a:bodyPr wrap="none" rtlCol="0">
+            <a:spAutoFit/>
+          </a:bodyPr>
+          <a:lstStyle/>
+          <a:p>
+            <a:r>
+              <a:rPr lang="en-US" smtClean="0"/>
+              <a:t>Integral </a:t>
+            </a:r>
+            <a:r>
+              <a:rPr lang="en-US" smtClean="0"/>
+              <a:t>DIY</a:t>
             </a:r>
             <a:endParaRPr lang="en-US"/>
           </a:p>
@@ -3288,7 +3387,7 @@
       </p:sp>
       <p:pic>
         <p:nvPicPr>
-          <p:cNvPr id="4" name="Content Placeholder 3"/>
+          <p:cNvPr id="9" name="Content Placeholder 8"/>
           <p:cNvPicPr>
             <a:picLocks noGrp="1" noChangeAspect="1"/>
           </p:cNvPicPr>
@@ -3310,21 +3409,81 @@
         </p:blipFill>
         <p:spPr>
           <a:xfrm>
-            <a:off x="838199" y="1690687"/>
-            <a:ext cx="4332741" cy="4332741"/>
+            <a:off x="5652055" y="2782094"/>
+            <a:ext cx="2438400" cy="2438400"/>
           </a:xfrm>
         </p:spPr>
       </p:pic>
-      <p:sp>
-        <p:nvSpPr>
-          <p:cNvPr id="5" name="Rectangle 4"/>
+      <p:pic>
+        <p:nvPicPr>
+          <p:cNvPr id="10" name="Picture 9"/>
+          <p:cNvPicPr>
+            <a:picLocks noChangeAspect="1"/>
+          </p:cNvPicPr>
+          <p:nvPr/>
+        </p:nvPicPr>
+        <p:blipFill>
+          <a:blip r:embed="rId3">
+            <a:extLst>
+              <a:ext uri="{28A0092B-C50C-407E-A947-70E740481C1C}">
+                <a14:useLocalDpi xmlns:a14="http://schemas.microsoft.com/office/drawing/2010/main" val="0"/>
+              </a:ext>
+            </a:extLst>
+          </a:blip>
+          <a:stretch>
+            <a:fillRect/>
+          </a:stretch>
+        </p:blipFill>
+        <p:spPr>
+          <a:xfrm>
+            <a:off x="2388710" y="2782094"/>
+            <a:ext cx="2438400" cy="2438400"/>
+          </a:xfrm>
+          <a:prstGeom prst="rect">
+            <a:avLst/>
+          </a:prstGeom>
+        </p:spPr>
+      </p:pic>
+      <p:pic>
+        <p:nvPicPr>
+          <p:cNvPr id="11" name="Picture 10"/>
+          <p:cNvPicPr>
+            <a:picLocks noChangeAspect="1"/>
+          </p:cNvPicPr>
+          <p:nvPr/>
+        </p:nvPicPr>
+        <p:blipFill>
+          <a:blip r:embed="rId3">
+            <a:extLst>
+              <a:ext uri="{28A0092B-C50C-407E-A947-70E740481C1C}">
+                <a14:useLocalDpi xmlns:a14="http://schemas.microsoft.com/office/drawing/2010/main" val="0"/>
+              </a:ext>
+            </a:extLst>
+          </a:blip>
+          <a:stretch>
+            <a:fillRect/>
+          </a:stretch>
+        </p:blipFill>
+        <p:spPr>
+          <a:xfrm>
+            <a:off x="8915400" y="2782094"/>
+            <a:ext cx="2438400" cy="2438400"/>
+          </a:xfrm>
+          <a:prstGeom prst="rect">
+            <a:avLst/>
+          </a:prstGeom>
+        </p:spPr>
+      </p:pic>
+      <p:sp>
+        <p:nvSpPr>
+          <p:cNvPr id="12" name="Rectangle 11"/>
           <p:cNvSpPr/>
           <p:nvPr/>
         </p:nvSpPr>
         <p:spPr>
           <a:xfrm>
-            <a:off x="6096000" y="1690687"/>
-            <a:ext cx="6096000" cy="3416320"/>
+            <a:off x="2388710" y="1515906"/>
+            <a:ext cx="6096000" cy="923330"/>
           </a:xfrm>
           <a:prstGeom prst="rect">
             <a:avLst/>
@@ -3337,89 +3496,34 @@
           <a:lstStyle/>
           <a:p>
             <a:r>
-              <a:rPr lang="en-US" smtClean="0"/>
-              <a:t>0.250000000000000	0	0</a:t>
-            </a:r>
-          </a:p>
-          <a:p>
-            <a:r>
-              <a:rPr lang="en-US" smtClean="0"/>
-              <a:t>0.250000000000000	0	0</a:t>
-            </a:r>
-          </a:p>
-          <a:p>
-            <a:r>
-              <a:rPr lang="en-US" smtClean="0"/>
-              <a:t>0.250000000000000	0	0</a:t>
-            </a:r>
-          </a:p>
-          <a:p>
-            <a:r>
-              <a:rPr lang="en-US" smtClean="0"/>
-              <a:t>0.250000000000000	0	0</a:t>
-            </a:r>
-          </a:p>
-          <a:p>
-            <a:r>
-              <a:rPr lang="en-US" smtClean="0"/>
-              <a:t>0	0.250000000000000	0</a:t>
-            </a:r>
-          </a:p>
-          <a:p>
-            <a:r>
-              <a:rPr lang="en-US" smtClean="0"/>
-              <a:t>0	0.250000000000000	0</a:t>
-            </a:r>
-          </a:p>
-          <a:p>
-            <a:r>
-              <a:rPr lang="en-US" smtClean="0"/>
-              <a:t>0	0.250000000000000	0</a:t>
-            </a:r>
-          </a:p>
-          <a:p>
-            <a:r>
-              <a:rPr lang="en-US" smtClean="0"/>
-              <a:t>0	0.250000000000000	0</a:t>
-            </a:r>
-          </a:p>
-          <a:p>
-            <a:r>
-              <a:rPr lang="en-US" smtClean="0"/>
-              <a:t>0	0	0.250000000000000</a:t>
-            </a:r>
-          </a:p>
-          <a:p>
-            <a:r>
-              <a:rPr lang="en-US" smtClean="0"/>
-              <a:t>0	0	0.250000000000000</a:t>
-            </a:r>
-          </a:p>
-          <a:p>
-            <a:r>
-              <a:rPr lang="en-US" smtClean="0"/>
-              <a:t>0	0	0.250000000000000</a:t>
-            </a:r>
-          </a:p>
-          <a:p>
-            <a:r>
-              <a:rPr lang="en-US" smtClean="0"/>
-              <a:t>0	0	0.250000000000000</a:t>
-            </a:r>
-            <a:endParaRPr lang="en-US"/>
-          </a:p>
-        </p:txBody>
-      </p:sp>
-      <p:sp>
-        <p:nvSpPr>
-          <p:cNvPr id="7" name="TextBox 6"/>
+              <a:rPr lang="en-US"/>
+              <a:t>-1	-1	-1</a:t>
+            </a:r>
+          </a:p>
+          <a:p>
+            <a:r>
+              <a:rPr lang="en-US"/>
+              <a:t>-1	9	-1</a:t>
+            </a:r>
+          </a:p>
+          <a:p>
+            <a:r>
+              <a:rPr lang="en-US"/>
+              <a:t>-1	-1	-1</a:t>
+            </a:r>
+          </a:p>
+        </p:txBody>
+      </p:sp>
+      <p:sp>
+        <p:nvSpPr>
+          <p:cNvPr id="13" name="TextBox 12"/>
           <p:cNvSpPr txBox="1"/>
           <p:nvPr/>
         </p:nvSpPr>
         <p:spPr>
           <a:xfrm>
-            <a:off x="7184505" y="5476070"/>
-            <a:ext cx="1696362" cy="369332"/>
+            <a:off x="1838559" y="1792905"/>
+            <a:ext cx="550151" cy="369332"/>
           </a:xfrm>
           <a:prstGeom prst="rect">
             <a:avLst/>
@@ -3434,7 +3538,7 @@
           <a:p>
             <a:r>
               <a:rPr lang="en-US" smtClean="0"/>
-              <a:t>Ma trận Hx = Hy</a:t>
+              <a:t>H = </a:t>
             </a:r>
             <a:endParaRPr lang="en-US"/>
           </a:p>
@@ -3443,7 +3547,7 @@
     </p:spTree>
     <p:extLst>
       <p:ext uri="{BB962C8B-B14F-4D97-AF65-F5344CB8AC3E}">
-        <p14:creationId xmlns:p14="http://schemas.microsoft.com/office/powerpoint/2010/main" val="603083048"/>
+        <p14:creationId xmlns:p14="http://schemas.microsoft.com/office/powerpoint/2010/main" val="1071273987"/>
       </p:ext>
     </p:extLst>
   </p:cSld>
@@ -3487,165 +3591,56 @@
           <a:p>
             <a:r>
               <a:rPr lang="en-US" smtClean="0"/>
-              <a:t>4. Sharpening filter</a:t>
-            </a:r>
-            <a:endParaRPr lang="en-US"/>
-          </a:p>
-        </p:txBody>
-      </p:sp>
-      <p:pic>
-        <p:nvPicPr>
-          <p:cNvPr id="4" name="Content Placeholder 3"/>
-          <p:cNvPicPr>
-            <a:picLocks noGrp="1" noChangeAspect="1"/>
-          </p:cNvPicPr>
+              <a:t>Nhận xét: 1000 vòng lặp</a:t>
+            </a:r>
+            <a:endParaRPr lang="en-US"/>
+          </a:p>
+        </p:txBody>
+      </p:sp>
+      <p:sp>
+        <p:nvSpPr>
+          <p:cNvPr id="3" name="Content Placeholder 2"/>
+          <p:cNvSpPr>
+            <a:spLocks noGrp="1"/>
+          </p:cNvSpPr>
           <p:nvPr>
             <p:ph idx="1"/>
           </p:nvPr>
-        </p:nvPicPr>
-        <p:blipFill>
-          <a:blip r:embed="rId2">
-            <a:extLst>
-              <a:ext uri="{28A0092B-C50C-407E-A947-70E740481C1C}">
-                <a14:useLocalDpi xmlns:a14="http://schemas.microsoft.com/office/drawing/2010/main" val="0"/>
-              </a:ext>
-            </a:extLst>
-          </a:blip>
-          <a:stretch>
-            <a:fillRect/>
-          </a:stretch>
-        </p:blipFill>
-        <p:spPr>
-          <a:xfrm>
-            <a:off x="2588400" y="2359800"/>
-            <a:ext cx="2438400" cy="2438400"/>
-          </a:xfrm>
-        </p:spPr>
-      </p:pic>
-      <p:pic>
-        <p:nvPicPr>
-          <p:cNvPr id="5" name="Picture 4"/>
-          <p:cNvPicPr>
-            <a:picLocks noChangeAspect="1"/>
-          </p:cNvPicPr>
-          <p:nvPr/>
-        </p:nvPicPr>
-        <p:blipFill>
-          <a:blip r:embed="rId3">
-            <a:extLst>
-              <a:ext uri="{28A0092B-C50C-407E-A947-70E740481C1C}">
-                <a14:useLocalDpi xmlns:a14="http://schemas.microsoft.com/office/drawing/2010/main" val="0"/>
-              </a:ext>
-            </a:extLst>
-          </a:blip>
-          <a:stretch>
-            <a:fillRect/>
-          </a:stretch>
-        </p:blipFill>
-        <p:spPr>
-          <a:xfrm>
-            <a:off x="5360629" y="2359800"/>
-            <a:ext cx="2438400" cy="2438400"/>
-          </a:xfrm>
-          <a:prstGeom prst="rect">
-            <a:avLst/>
-          </a:prstGeom>
-        </p:spPr>
-      </p:pic>
-      <p:sp>
-        <p:nvSpPr>
-          <p:cNvPr id="6" name="TextBox 5"/>
-          <p:cNvSpPr txBox="1"/>
-          <p:nvPr/>
-        </p:nvSpPr>
-        <p:spPr>
-          <a:xfrm>
-            <a:off x="3381297" y="5268686"/>
-            <a:ext cx="852606" cy="369332"/>
-          </a:xfrm>
-          <a:prstGeom prst="rect">
-            <a:avLst/>
-          </a:prstGeom>
-          <a:noFill/>
-        </p:spPr>
-        <p:txBody>
-          <a:bodyPr wrap="none" rtlCol="0">
-            <a:spAutoFit/>
-          </a:bodyPr>
-          <a:lstStyle/>
-          <a:p>
-            <a:r>
-              <a:rPr lang="en-US" smtClean="0"/>
-              <a:t>Matlab</a:t>
-            </a:r>
-            <a:endParaRPr lang="en-US"/>
-          </a:p>
-        </p:txBody>
-      </p:sp>
-      <p:sp>
-        <p:nvSpPr>
-          <p:cNvPr id="7" name="TextBox 6"/>
-          <p:cNvSpPr txBox="1"/>
-          <p:nvPr/>
-        </p:nvSpPr>
-        <p:spPr>
-          <a:xfrm>
-            <a:off x="6331203" y="5268686"/>
-            <a:ext cx="1080104" cy="369332"/>
-          </a:xfrm>
-          <a:prstGeom prst="rect">
-            <a:avLst/>
-          </a:prstGeom>
-          <a:noFill/>
-        </p:spPr>
-        <p:txBody>
-          <a:bodyPr wrap="none" rtlCol="0">
-            <a:spAutoFit/>
-          </a:bodyPr>
-          <a:lstStyle/>
-          <a:p>
-            <a:r>
-              <a:rPr lang="en-US" smtClean="0"/>
-              <a:t>Naive DIY</a:t>
-            </a:r>
-            <a:endParaRPr lang="en-US"/>
-          </a:p>
-        </p:txBody>
-      </p:sp>
-      <p:sp>
-        <p:nvSpPr>
-          <p:cNvPr id="8" name="TextBox 7"/>
-          <p:cNvSpPr txBox="1"/>
-          <p:nvPr/>
-        </p:nvSpPr>
-        <p:spPr>
-          <a:xfrm>
-            <a:off x="8264236" y="5268686"/>
-            <a:ext cx="3089564" cy="369332"/>
-          </a:xfrm>
-          <a:prstGeom prst="rect">
-            <a:avLst/>
-          </a:prstGeom>
-          <a:noFill/>
-        </p:spPr>
-        <p:txBody>
-          <a:bodyPr wrap="none" rtlCol="0">
-            <a:spAutoFit/>
-          </a:bodyPr>
-          <a:lstStyle/>
-          <a:p>
-            <a:r>
-              <a:rPr lang="en-US" smtClean="0"/>
-              <a:t>Integral DIY (Chưa hoàn thành)</a:t>
-            </a:r>
-            <a:endParaRPr lang="en-US"/>
+        </p:nvSpPr>
+        <p:spPr/>
+        <p:txBody>
+          <a:bodyPr/>
+          <a:lstStyle/>
+          <a:p>
+            <a:r>
+              <a:rPr lang="en-US"/>
+              <a:t>Integral: </a:t>
+            </a:r>
+            <a:r>
+              <a:rPr lang="en-US"/>
+              <a:t>10.530 </a:t>
+            </a:r>
+            <a:r>
+              <a:rPr lang="en-US" smtClean="0"/>
+              <a:t>s</a:t>
+            </a:r>
+          </a:p>
+          <a:p>
+            <a:r>
+              <a:rPr lang="en-US" smtClean="0"/>
+              <a:t>Naive</a:t>
+            </a:r>
+            <a:r>
+              <a:rPr lang="en-US"/>
+              <a:t>: 212.455 s</a:t>
+            </a:r>
           </a:p>
         </p:txBody>
       </p:sp>
     </p:spTree>
     <p:extLst>
       <p:ext uri="{BB962C8B-B14F-4D97-AF65-F5344CB8AC3E}">
-        <p14:creationId xmlns:p14="http://schemas.microsoft.com/office/powerpoint/2010/main" val="1071273987"/>
+        <p14:creationId xmlns:p14="http://schemas.microsoft.com/office/powerpoint/2010/main" val="973679640"/>
       </p:ext>
     </p:extLst>
   </p:cSld>
@@ -4162,7 +4157,7 @@
         </p:blipFill>
         <p:spPr>
           <a:xfrm>
-            <a:off x="9399699" y="4903899"/>
+            <a:off x="9399698" y="4912744"/>
             <a:ext cx="1954101" cy="1954101"/>
           </a:xfrm>
           <a:prstGeom prst="rect">
@@ -4491,7 +4486,6 @@
               <a:rPr lang="en-US" smtClean="0"/>
               <a:t>25, i = 1000, t = 48.844 s</a:t>
             </a:r>
-            <a:endParaRPr lang="en-US" smtClean="0"/>
           </a:p>
           <a:p>
             <a:r>
@@ -4570,7 +4564,12 @@
             <p:ph type="title"/>
           </p:nvPr>
         </p:nvSpPr>
-        <p:spPr/>
+        <p:spPr>
+          <a:xfrm>
+            <a:off x="0" y="1"/>
+            <a:ext cx="2552700" cy="1320800"/>
+          </a:xfrm>
+        </p:spPr>
         <p:txBody>
           <a:bodyPr/>
           <a:lstStyle/>
@@ -4593,7 +4592,12 @@
             <p:ph idx="1"/>
           </p:nvPr>
         </p:nvSpPr>
-        <p:spPr/>
+        <p:spPr>
+          <a:xfrm>
+            <a:off x="-1" y="1453356"/>
+            <a:ext cx="2552699" cy="4351338"/>
+          </a:xfrm>
+        </p:spPr>
         <p:txBody>
           <a:bodyPr/>
           <a:lstStyle/>
@@ -4603,7 +4607,341 @@
             </a:pPr>
             <a:r>
               <a:rPr lang="en-US" smtClean="0"/>
-              <a:t>1.2 Test với ảnh nhiễu Gauss (Chưa hoàn thành)</a:t>
+              <a:t>1.2 Test với ảnh nhiễu </a:t>
+            </a:r>
+            <a:r>
+              <a:rPr lang="en-US" smtClean="0"/>
+              <a:t>Gauss</a:t>
+            </a:r>
+            <a:endParaRPr lang="en-US"/>
+          </a:p>
+        </p:txBody>
+      </p:sp>
+      <p:pic>
+        <p:nvPicPr>
+          <p:cNvPr id="4" name="Picture 3"/>
+          <p:cNvPicPr>
+            <a:picLocks noChangeAspect="1"/>
+          </p:cNvPicPr>
+          <p:nvPr/>
+        </p:nvPicPr>
+        <p:blipFill>
+          <a:blip r:embed="rId2">
+            <a:extLst>
+              <a:ext uri="{28A0092B-C50C-407E-A947-70E740481C1C}">
+                <a14:useLocalDpi xmlns:a14="http://schemas.microsoft.com/office/drawing/2010/main" val="0"/>
+              </a:ext>
+            </a:extLst>
+          </a:blip>
+          <a:stretch>
+            <a:fillRect/>
+          </a:stretch>
+        </p:blipFill>
+        <p:spPr>
+          <a:xfrm>
+            <a:off x="3898898" y="1320801"/>
+            <a:ext cx="2759075" cy="2759075"/>
+          </a:xfrm>
+          <a:prstGeom prst="rect">
+            <a:avLst/>
+          </a:prstGeom>
+        </p:spPr>
+      </p:pic>
+      <p:pic>
+        <p:nvPicPr>
+          <p:cNvPr id="7" name="Picture 6"/>
+          <p:cNvPicPr>
+            <a:picLocks noChangeAspect="1"/>
+          </p:cNvPicPr>
+          <p:nvPr/>
+        </p:nvPicPr>
+        <p:blipFill>
+          <a:blip r:embed="rId3">
+            <a:extLst>
+              <a:ext uri="{28A0092B-C50C-407E-A947-70E740481C1C}">
+                <a14:useLocalDpi xmlns:a14="http://schemas.microsoft.com/office/drawing/2010/main" val="0"/>
+              </a:ext>
+            </a:extLst>
+          </a:blip>
+          <a:stretch>
+            <a:fillRect/>
+          </a:stretch>
+        </p:blipFill>
+        <p:spPr>
+          <a:xfrm>
+            <a:off x="6657973" y="1320800"/>
+            <a:ext cx="2759075" cy="2759075"/>
+          </a:xfrm>
+          <a:prstGeom prst="rect">
+            <a:avLst/>
+          </a:prstGeom>
+        </p:spPr>
+      </p:pic>
+      <p:pic>
+        <p:nvPicPr>
+          <p:cNvPr id="8" name="Picture 7"/>
+          <p:cNvPicPr>
+            <a:picLocks noChangeAspect="1"/>
+          </p:cNvPicPr>
+          <p:nvPr/>
+        </p:nvPicPr>
+        <p:blipFill>
+          <a:blip r:embed="rId4">
+            <a:extLst>
+              <a:ext uri="{28A0092B-C50C-407E-A947-70E740481C1C}">
+                <a14:useLocalDpi xmlns:a14="http://schemas.microsoft.com/office/drawing/2010/main" val="0"/>
+              </a:ext>
+            </a:extLst>
+          </a:blip>
+          <a:stretch>
+            <a:fillRect/>
+          </a:stretch>
+        </p:blipFill>
+        <p:spPr>
+          <a:xfrm>
+            <a:off x="9417048" y="1320799"/>
+            <a:ext cx="2759075" cy="2759075"/>
+          </a:xfrm>
+          <a:prstGeom prst="rect">
+            <a:avLst/>
+          </a:prstGeom>
+        </p:spPr>
+      </p:pic>
+      <p:pic>
+        <p:nvPicPr>
+          <p:cNvPr id="9" name="Picture 8"/>
+          <p:cNvPicPr>
+            <a:picLocks noChangeAspect="1"/>
+          </p:cNvPicPr>
+          <p:nvPr/>
+        </p:nvPicPr>
+        <p:blipFill>
+          <a:blip r:embed="rId5">
+            <a:extLst>
+              <a:ext uri="{28A0092B-C50C-407E-A947-70E740481C1C}">
+                <a14:useLocalDpi xmlns:a14="http://schemas.microsoft.com/office/drawing/2010/main" val="0"/>
+              </a:ext>
+            </a:extLst>
+          </a:blip>
+          <a:stretch>
+            <a:fillRect/>
+          </a:stretch>
+        </p:blipFill>
+        <p:spPr>
+          <a:xfrm>
+            <a:off x="3898897" y="4079873"/>
+            <a:ext cx="2759075" cy="2759075"/>
+          </a:xfrm>
+          <a:prstGeom prst="rect">
+            <a:avLst/>
+          </a:prstGeom>
+        </p:spPr>
+      </p:pic>
+      <p:pic>
+        <p:nvPicPr>
+          <p:cNvPr id="10" name="Picture 9"/>
+          <p:cNvPicPr>
+            <a:picLocks noChangeAspect="1"/>
+          </p:cNvPicPr>
+          <p:nvPr/>
+        </p:nvPicPr>
+        <p:blipFill>
+          <a:blip r:embed="rId6">
+            <a:extLst>
+              <a:ext uri="{28A0092B-C50C-407E-A947-70E740481C1C}">
+                <a14:useLocalDpi xmlns:a14="http://schemas.microsoft.com/office/drawing/2010/main" val="0"/>
+              </a:ext>
+            </a:extLst>
+          </a:blip>
+          <a:stretch>
+            <a:fillRect/>
+          </a:stretch>
+        </p:blipFill>
+        <p:spPr>
+          <a:xfrm>
+            <a:off x="6657972" y="4079872"/>
+            <a:ext cx="2759075" cy="2759075"/>
+          </a:xfrm>
+          <a:prstGeom prst="rect">
+            <a:avLst/>
+          </a:prstGeom>
+        </p:spPr>
+      </p:pic>
+      <p:pic>
+        <p:nvPicPr>
+          <p:cNvPr id="11" name="Picture 10"/>
+          <p:cNvPicPr>
+            <a:picLocks noChangeAspect="1"/>
+          </p:cNvPicPr>
+          <p:nvPr/>
+        </p:nvPicPr>
+        <p:blipFill>
+          <a:blip r:embed="rId7">
+            <a:extLst>
+              <a:ext uri="{28A0092B-C50C-407E-A947-70E740481C1C}">
+                <a14:useLocalDpi xmlns:a14="http://schemas.microsoft.com/office/drawing/2010/main" val="0"/>
+              </a:ext>
+            </a:extLst>
+          </a:blip>
+          <a:stretch>
+            <a:fillRect/>
+          </a:stretch>
+        </p:blipFill>
+        <p:spPr>
+          <a:xfrm>
+            <a:off x="9417047" y="4079872"/>
+            <a:ext cx="2759075" cy="2759075"/>
+          </a:xfrm>
+          <a:prstGeom prst="rect">
+            <a:avLst/>
+          </a:prstGeom>
+        </p:spPr>
+      </p:pic>
+      <p:sp>
+        <p:nvSpPr>
+          <p:cNvPr id="17" name="TextBox 16"/>
+          <p:cNvSpPr txBox="1"/>
+          <p:nvPr/>
+        </p:nvSpPr>
+        <p:spPr>
+          <a:xfrm>
+            <a:off x="2552698" y="2377170"/>
+            <a:ext cx="1346199" cy="369332"/>
+          </a:xfrm>
+          <a:prstGeom prst="rect">
+            <a:avLst/>
+          </a:prstGeom>
+          <a:noFill/>
+        </p:spPr>
+        <p:txBody>
+          <a:bodyPr wrap="square" rtlCol="0">
+            <a:spAutoFit/>
+          </a:bodyPr>
+          <a:lstStyle/>
+          <a:p>
+            <a:r>
+              <a:rPr lang="en-US" smtClean="0"/>
+              <a:t>Sigma = 10</a:t>
+            </a:r>
+            <a:endParaRPr lang="en-US"/>
+          </a:p>
+        </p:txBody>
+      </p:sp>
+      <p:sp>
+        <p:nvSpPr>
+          <p:cNvPr id="18" name="TextBox 17"/>
+          <p:cNvSpPr txBox="1"/>
+          <p:nvPr/>
+        </p:nvSpPr>
+        <p:spPr>
+          <a:xfrm>
+            <a:off x="2552698" y="5274743"/>
+            <a:ext cx="1346199" cy="369332"/>
+          </a:xfrm>
+          <a:prstGeom prst="rect">
+            <a:avLst/>
+          </a:prstGeom>
+          <a:noFill/>
+        </p:spPr>
+        <p:txBody>
+          <a:bodyPr wrap="square" rtlCol="0">
+            <a:spAutoFit/>
+          </a:bodyPr>
+          <a:lstStyle/>
+          <a:p>
+            <a:r>
+              <a:rPr lang="en-US" smtClean="0"/>
+              <a:t>Sigma = 50</a:t>
+            </a:r>
+            <a:endParaRPr lang="en-US"/>
+          </a:p>
+        </p:txBody>
+      </p:sp>
+      <p:sp>
+        <p:nvSpPr>
+          <p:cNvPr id="19" name="TextBox 18"/>
+          <p:cNvSpPr txBox="1"/>
+          <p:nvPr/>
+        </p:nvSpPr>
+        <p:spPr>
+          <a:xfrm>
+            <a:off x="4901568" y="890626"/>
+            <a:ext cx="753732" cy="369332"/>
+          </a:xfrm>
+          <a:prstGeom prst="rect">
+            <a:avLst/>
+          </a:prstGeom>
+          <a:noFill/>
+        </p:spPr>
+        <p:txBody>
+          <a:bodyPr wrap="none" rtlCol="0">
+            <a:spAutoFit/>
+          </a:bodyPr>
+          <a:lstStyle/>
+          <a:p>
+            <a:r>
+              <a:rPr lang="en-US" smtClean="0"/>
+              <a:t>Origin</a:t>
+            </a:r>
+            <a:endParaRPr lang="en-US"/>
+          </a:p>
+        </p:txBody>
+      </p:sp>
+      <p:sp>
+        <p:nvSpPr>
+          <p:cNvPr id="20" name="TextBox 19"/>
+          <p:cNvSpPr txBox="1"/>
+          <p:nvPr/>
+        </p:nvSpPr>
+        <p:spPr>
+          <a:xfrm>
+            <a:off x="7373255" y="890626"/>
+            <a:ext cx="1411990" cy="369332"/>
+          </a:xfrm>
+          <a:prstGeom prst="rect">
+            <a:avLst/>
+          </a:prstGeom>
+          <a:noFill/>
+        </p:spPr>
+        <p:txBody>
+          <a:bodyPr wrap="none" rtlCol="0">
+            <a:spAutoFit/>
+          </a:bodyPr>
+          <a:lstStyle/>
+          <a:p>
+            <a:r>
+              <a:rPr lang="en-US" smtClean="0"/>
+              <a:t>Box filter 3x3</a:t>
+            </a:r>
+            <a:endParaRPr lang="en-US"/>
+          </a:p>
+        </p:txBody>
+      </p:sp>
+      <p:sp>
+        <p:nvSpPr>
+          <p:cNvPr id="21" name="TextBox 20"/>
+          <p:cNvSpPr txBox="1"/>
+          <p:nvPr/>
+        </p:nvSpPr>
+        <p:spPr>
+          <a:xfrm>
+            <a:off x="10090589" y="888685"/>
+            <a:ext cx="1411990" cy="369332"/>
+          </a:xfrm>
+          <a:prstGeom prst="rect">
+            <a:avLst/>
+          </a:prstGeom>
+          <a:noFill/>
+        </p:spPr>
+        <p:txBody>
+          <a:bodyPr wrap="none" rtlCol="0">
+            <a:spAutoFit/>
+          </a:bodyPr>
+          <a:lstStyle/>
+          <a:p>
+            <a:r>
+              <a:rPr lang="en-US" smtClean="0"/>
+              <a:t>Box filter 9x9</a:t>
             </a:r>
             <a:endParaRPr lang="en-US"/>
           </a:p>
@@ -4691,9 +5029,73 @@
           </a:xfrm>
         </p:spPr>
       </p:pic>
+      <p:sp>
+        <p:nvSpPr>
+          <p:cNvPr id="6" name="TextBox 5"/>
+          <p:cNvSpPr txBox="1"/>
+          <p:nvPr/>
+        </p:nvSpPr>
+        <p:spPr>
+          <a:xfrm>
+            <a:off x="2241221" y="6259678"/>
+            <a:ext cx="1545295" cy="369332"/>
+          </a:xfrm>
+          <a:prstGeom prst="rect">
+            <a:avLst/>
+          </a:prstGeom>
+          <a:noFill/>
+        </p:spPr>
+        <p:txBody>
+          <a:bodyPr wrap="none" rtlCol="0">
+            <a:spAutoFit/>
+          </a:bodyPr>
+          <a:lstStyle/>
+          <a:p>
+            <a:r>
+              <a:rPr lang="en-US" smtClean="0"/>
+              <a:t>Original Image</a:t>
+            </a:r>
+            <a:endParaRPr lang="en-US"/>
+          </a:p>
+        </p:txBody>
+      </p:sp>
+      <p:sp>
+        <p:nvSpPr>
+          <p:cNvPr id="7" name="TextBox 6"/>
+          <p:cNvSpPr txBox="1"/>
+          <p:nvPr/>
+        </p:nvSpPr>
+        <p:spPr>
+          <a:xfrm>
+            <a:off x="7439656" y="6259678"/>
+            <a:ext cx="2334422" cy="369332"/>
+          </a:xfrm>
+          <a:prstGeom prst="rect">
+            <a:avLst/>
+          </a:prstGeom>
+          <a:noFill/>
+        </p:spPr>
+        <p:txBody>
+          <a:bodyPr wrap="none" rtlCol="0">
+            <a:spAutoFit/>
+          </a:bodyPr>
+          <a:lstStyle/>
+          <a:p>
+            <a:r>
+              <a:rPr lang="en-US" smtClean="0"/>
+              <a:t>Gauss </a:t>
+            </a:r>
+            <a:r>
+              <a:rPr lang="en-US" smtClean="0"/>
+              <a:t>filter, sigma = 10</a:t>
+            </a:r>
+            <a:endParaRPr lang="en-US"/>
+          </a:p>
+        </p:txBody>
+      </p:sp>
       <p:pic>
         <p:nvPicPr>
-          <p:cNvPr id="5" name="Picture 4"/>
+          <p:cNvPr id="3" name="Picture 2"/>
           <p:cNvPicPr>
             <a:picLocks noChangeAspect="1"/>
           </p:cNvPicPr>
@@ -4713,74 +5115,14 @@
         </p:blipFill>
         <p:spPr>
           <a:xfrm>
-            <a:off x="5884862" y="1690688"/>
-            <a:ext cx="4351338" cy="4351338"/>
+            <a:off x="5882003" y="1684970"/>
+            <a:ext cx="4357056" cy="4357056"/>
           </a:xfrm>
           <a:prstGeom prst="rect">
             <a:avLst/>
           </a:prstGeom>
         </p:spPr>
       </p:pic>
-      <p:sp>
-        <p:nvSpPr>
-          <p:cNvPr id="6" name="TextBox 5"/>
-          <p:cNvSpPr txBox="1"/>
-          <p:nvPr/>
-        </p:nvSpPr>
-        <p:spPr>
-          <a:xfrm>
-            <a:off x="2241221" y="6259678"/>
-            <a:ext cx="1545295" cy="369332"/>
-          </a:xfrm>
-          <a:prstGeom prst="rect">
-            <a:avLst/>
-          </a:prstGeom>
-          <a:noFill/>
-        </p:spPr>
-        <p:txBody>
-          <a:bodyPr wrap="none" rtlCol="0">
-            <a:spAutoFit/>
-          </a:bodyPr>
-          <a:lstStyle/>
-          <a:p>
-            <a:r>
-              <a:rPr lang="en-US" smtClean="0"/>
-              <a:t>Original Image</a:t>
-            </a:r>
-            <a:endParaRPr lang="en-US"/>
-          </a:p>
-        </p:txBody>
-      </p:sp>
-      <p:sp>
-        <p:nvSpPr>
-          <p:cNvPr id="7" name="TextBox 6"/>
-          <p:cNvSpPr txBox="1"/>
-          <p:nvPr/>
-        </p:nvSpPr>
-        <p:spPr>
-          <a:xfrm>
-            <a:off x="7439656" y="6259678"/>
-            <a:ext cx="1241750" cy="369332"/>
-          </a:xfrm>
-          <a:prstGeom prst="rect">
-            <a:avLst/>
-          </a:prstGeom>
-          <a:noFill/>
-        </p:spPr>
-        <p:txBody>
-          <a:bodyPr wrap="none" rtlCol="0">
-            <a:spAutoFit/>
-          </a:bodyPr>
-          <a:lstStyle/>
-          <a:p>
-            <a:r>
-              <a:rPr lang="en-US" smtClean="0"/>
-              <a:t>Gauss filter</a:t>
-            </a:r>
-            <a:endParaRPr lang="en-US"/>
-          </a:p>
-        </p:txBody>
-      </p:sp>
     </p:spTree>
     <p:extLst>
       <p:ext uri="{BB962C8B-B14F-4D97-AF65-F5344CB8AC3E}">
@@ -4791,6 +5133,13 @@
   <p:clrMapOvr>
     <a:masterClrMapping/>
   </p:clrMapOvr>
+  <p:timing>
+    <p:tnLst>
+      <p:par>
+        <p:cTn id="1" dur="indefinite" restart="never" nodeType="tmRoot"/>
+      </p:par>
+    </p:tnLst>
+  </p:timing>
 </p:sld>
 </file>
 
@@ -4811,9 +5160,163 @@
           <a:chExt cx="0" cy="0"/>
         </a:xfrm>
       </p:grpSpPr>
+      <p:sp>
+        <p:nvSpPr>
+          <p:cNvPr id="10" name="TextBox 9"/>
+          <p:cNvSpPr txBox="1"/>
+          <p:nvPr/>
+        </p:nvSpPr>
+        <p:spPr>
+          <a:xfrm>
+            <a:off x="435429" y="2046514"/>
+            <a:ext cx="1025665" cy="369332"/>
+          </a:xfrm>
+          <a:prstGeom prst="rect">
+            <a:avLst/>
+          </a:prstGeom>
+          <a:noFill/>
+        </p:spPr>
+        <p:txBody>
+          <a:bodyPr wrap="none" rtlCol="0">
+            <a:spAutoFit/>
+          </a:bodyPr>
+          <a:lstStyle/>
+          <a:p>
+            <a:r>
+              <a:rPr lang="en-US" smtClean="0"/>
+              <a:t>Box filter</a:t>
+            </a:r>
+            <a:endParaRPr lang="en-US"/>
+          </a:p>
+        </p:txBody>
+      </p:sp>
+      <p:sp>
+        <p:nvSpPr>
+          <p:cNvPr id="11" name="TextBox 10"/>
+          <p:cNvSpPr txBox="1"/>
+          <p:nvPr/>
+        </p:nvSpPr>
+        <p:spPr>
+          <a:xfrm>
+            <a:off x="374947" y="3860741"/>
+            <a:ext cx="1146628" cy="923330"/>
+          </a:xfrm>
+          <a:prstGeom prst="rect">
+            <a:avLst/>
+          </a:prstGeom>
+          <a:noFill/>
+        </p:spPr>
+        <p:txBody>
+          <a:bodyPr wrap="square" rtlCol="0">
+            <a:spAutoFit/>
+          </a:bodyPr>
+          <a:lstStyle/>
+          <a:p>
+            <a:r>
+              <a:rPr lang="en-US" smtClean="0"/>
+              <a:t>So sánh với Gauss filter</a:t>
+            </a:r>
+            <a:endParaRPr lang="en-US"/>
+          </a:p>
+        </p:txBody>
+      </p:sp>
+      <p:sp>
+        <p:nvSpPr>
+          <p:cNvPr id="12" name="TextBox 11"/>
+          <p:cNvSpPr txBox="1"/>
+          <p:nvPr/>
+        </p:nvSpPr>
+        <p:spPr>
+          <a:xfrm>
+            <a:off x="2520480" y="311666"/>
+            <a:ext cx="671979" cy="369332"/>
+          </a:xfrm>
+          <a:prstGeom prst="rect">
+            <a:avLst/>
+          </a:prstGeom>
+          <a:noFill/>
+        </p:spPr>
+        <p:txBody>
+          <a:bodyPr wrap="none" rtlCol="0">
+            <a:spAutoFit/>
+          </a:bodyPr>
+          <a:lstStyle/>
+          <a:p>
+            <a:r>
+              <a:rPr lang="en-US" smtClean="0"/>
+              <a:t>N = 1</a:t>
+            </a:r>
+            <a:endParaRPr lang="en-US"/>
+          </a:p>
+        </p:txBody>
+      </p:sp>
+      <p:sp>
+        <p:nvSpPr>
+          <p:cNvPr id="13" name="TextBox 12"/>
+          <p:cNvSpPr txBox="1"/>
+          <p:nvPr/>
+        </p:nvSpPr>
+        <p:spPr>
+          <a:xfrm>
+            <a:off x="7879018" y="336989"/>
+            <a:ext cx="671979" cy="369332"/>
+          </a:xfrm>
+          <a:prstGeom prst="rect">
+            <a:avLst/>
+          </a:prstGeom>
+          <a:noFill/>
+        </p:spPr>
+        <p:txBody>
+          <a:bodyPr wrap="none" rtlCol="0">
+            <a:spAutoFit/>
+          </a:bodyPr>
+          <a:lstStyle/>
+          <a:p>
+            <a:r>
+              <a:rPr lang="en-US" smtClean="0"/>
+              <a:t>N = 5</a:t>
+            </a:r>
+            <a:endParaRPr lang="en-US"/>
+          </a:p>
+        </p:txBody>
+      </p:sp>
+      <p:sp>
+        <p:nvSpPr>
+          <p:cNvPr id="14" name="TextBox 13"/>
+          <p:cNvSpPr txBox="1"/>
+          <p:nvPr/>
+        </p:nvSpPr>
+        <p:spPr>
+          <a:xfrm>
+            <a:off x="10392084" y="336989"/>
+            <a:ext cx="788999" cy="369332"/>
+          </a:xfrm>
+          <a:prstGeom prst="rect">
+            <a:avLst/>
+          </a:prstGeom>
+          <a:noFill/>
+        </p:spPr>
+        <p:txBody>
+          <a:bodyPr wrap="none" rtlCol="0">
+            <a:spAutoFit/>
+          </a:bodyPr>
+          <a:lstStyle/>
+          <a:p>
+            <a:r>
+              <a:rPr lang="en-US" smtClean="0"/>
+              <a:t>N = </a:t>
+            </a:r>
+            <a:r>
+              <a:rPr lang="en-US" smtClean="0"/>
+              <a:t>10</a:t>
+            </a:r>
+            <a:endParaRPr lang="en-US"/>
+          </a:p>
+        </p:txBody>
+      </p:sp>
       <p:pic>
         <p:nvPicPr>
-          <p:cNvPr id="4" name="Content Placeholder 3"/>
+          <p:cNvPr id="3" name="Content Placeholder 2"/>
           <p:cNvPicPr>
             <a:picLocks noGrp="1" noChangeAspect="1"/>
           </p:cNvPicPr>
@@ -4835,14 +5338,14 @@
         </p:blipFill>
         <p:spPr>
           <a:xfrm>
-            <a:off x="2295966" y="3772028"/>
-            <a:ext cx="3035168" cy="3035168"/>
+            <a:off x="1647765" y="3113701"/>
+            <a:ext cx="2417411" cy="2417411"/>
           </a:xfrm>
         </p:spPr>
       </p:pic>
       <p:pic>
         <p:nvPicPr>
-          <p:cNvPr id="5" name="Picture 4"/>
+          <p:cNvPr id="15" name="Picture 14"/>
           <p:cNvPicPr>
             <a:picLocks noChangeAspect="1"/>
           </p:cNvPicPr>
@@ -4862,8 +5365,8 @@
         </p:blipFill>
         <p:spPr>
           <a:xfrm>
-            <a:off x="2295966" y="742492"/>
-            <a:ext cx="3029536" cy="3029536"/>
+            <a:off x="1647766" y="688644"/>
+            <a:ext cx="2417411" cy="2417411"/>
           </a:xfrm>
           <a:prstGeom prst="rect">
             <a:avLst/>
@@ -4872,7 +5375,7 @@
       </p:pic>
       <p:pic>
         <p:nvPicPr>
-          <p:cNvPr id="6" name="Picture 5"/>
+          <p:cNvPr id="16" name="Picture 15"/>
           <p:cNvPicPr>
             <a:picLocks noChangeAspect="1"/>
           </p:cNvPicPr>
@@ -4892,8 +5395,8 @@
         </p:blipFill>
         <p:spPr>
           <a:xfrm>
-            <a:off x="5325502" y="3772028"/>
-            <a:ext cx="3035168" cy="3035168"/>
+            <a:off x="4298537" y="3113701"/>
+            <a:ext cx="2417411" cy="2417411"/>
           </a:xfrm>
           <a:prstGeom prst="rect">
             <a:avLst/>
@@ -4902,7 +5405,7 @@
       </p:pic>
       <p:pic>
         <p:nvPicPr>
-          <p:cNvPr id="7" name="Picture 6"/>
+          <p:cNvPr id="17" name="Picture 16"/>
           <p:cNvPicPr>
             <a:picLocks noChangeAspect="1"/>
           </p:cNvPicPr>
@@ -4922,8 +5425,8 @@
         </p:blipFill>
         <p:spPr>
           <a:xfrm>
-            <a:off x="5325502" y="742492"/>
-            <a:ext cx="3029536" cy="3029536"/>
+            <a:off x="4298537" y="688644"/>
+            <a:ext cx="2417411" cy="2417411"/>
           </a:xfrm>
           <a:prstGeom prst="rect">
             <a:avLst/>
@@ -4932,7 +5435,7 @@
       </p:pic>
       <p:pic>
         <p:nvPicPr>
-          <p:cNvPr id="8" name="Picture 7"/>
+          <p:cNvPr id="18" name="Picture 17"/>
           <p:cNvPicPr>
             <a:picLocks noChangeAspect="1"/>
           </p:cNvPicPr>
@@ -4952,8 +5455,8 @@
         </p:blipFill>
         <p:spPr>
           <a:xfrm>
-            <a:off x="8333144" y="3772028"/>
-            <a:ext cx="3035168" cy="3035168"/>
+            <a:off x="6958700" y="3141409"/>
+            <a:ext cx="2417411" cy="2417411"/>
           </a:xfrm>
           <a:prstGeom prst="rect">
             <a:avLst/>
@@ -4962,7 +5465,7 @@
       </p:pic>
       <p:pic>
         <p:nvPicPr>
-          <p:cNvPr id="9" name="Picture 8"/>
+          <p:cNvPr id="19" name="Picture 18"/>
           <p:cNvPicPr>
             <a:picLocks noChangeAspect="1"/>
           </p:cNvPicPr>
@@ -4982,8 +5485,8 @@
         </p:blipFill>
         <p:spPr>
           <a:xfrm>
-            <a:off x="8355038" y="742492"/>
-            <a:ext cx="3029536" cy="3029536"/>
+            <a:off x="6958700" y="706322"/>
+            <a:ext cx="2417411" cy="2417411"/>
           </a:xfrm>
           <a:prstGeom prst="rect">
             <a:avLst/>
@@ -4992,14 +5495,14 @@
       </p:pic>
       <p:sp>
         <p:nvSpPr>
-          <p:cNvPr id="10" name="TextBox 9"/>
+          <p:cNvPr id="22" name="TextBox 21"/>
           <p:cNvSpPr txBox="1"/>
           <p:nvPr/>
         </p:nvSpPr>
         <p:spPr>
           <a:xfrm>
-            <a:off x="435429" y="2046514"/>
-            <a:ext cx="1025665" cy="369332"/>
+            <a:off x="5171252" y="311666"/>
+            <a:ext cx="671979" cy="369332"/>
           </a:xfrm>
           <a:prstGeom prst="rect">
             <a:avLst/>
@@ -5014,52 +5517,86 @@
           <a:p>
             <a:r>
               <a:rPr lang="en-US" smtClean="0"/>
-              <a:t>Box filter</a:t>
-            </a:r>
-            <a:endParaRPr lang="en-US"/>
-          </a:p>
-        </p:txBody>
-      </p:sp>
-      <p:sp>
-        <p:nvSpPr>
-          <p:cNvPr id="11" name="TextBox 10"/>
+              <a:t>N = </a:t>
+            </a:r>
+            <a:r>
+              <a:rPr lang="en-US" smtClean="0"/>
+              <a:t>3</a:t>
+            </a:r>
+            <a:endParaRPr lang="en-US"/>
+          </a:p>
+        </p:txBody>
+      </p:sp>
+      <p:pic>
+        <p:nvPicPr>
+          <p:cNvPr id="23" name="Picture 22"/>
+          <p:cNvPicPr>
+            <a:picLocks noChangeAspect="1"/>
+          </p:cNvPicPr>
+          <p:nvPr/>
+        </p:nvPicPr>
+        <p:blipFill>
+          <a:blip r:embed="rId8">
+            <a:extLst>
+              <a:ext uri="{28A0092B-C50C-407E-A947-70E740481C1C}">
+                <a14:useLocalDpi xmlns:a14="http://schemas.microsoft.com/office/drawing/2010/main" val="0"/>
+              </a:ext>
+            </a:extLst>
+          </a:blip>
+          <a:stretch>
+            <a:fillRect/>
+          </a:stretch>
+        </p:blipFill>
+        <p:spPr>
+          <a:xfrm>
+            <a:off x="9569039" y="3209829"/>
+            <a:ext cx="2399734" cy="2399734"/>
+          </a:xfrm>
+          <a:prstGeom prst="rect">
+            <a:avLst/>
+          </a:prstGeom>
+        </p:spPr>
+      </p:pic>
+      <p:pic>
+        <p:nvPicPr>
+          <p:cNvPr id="24" name="Picture 23"/>
+          <p:cNvPicPr>
+            <a:picLocks noChangeAspect="1"/>
+          </p:cNvPicPr>
+          <p:nvPr/>
+        </p:nvPicPr>
+        <p:blipFill>
+          <a:blip r:embed="rId9">
+            <a:extLst>
+              <a:ext uri="{28A0092B-C50C-407E-A947-70E740481C1C}">
+                <a14:useLocalDpi xmlns:a14="http://schemas.microsoft.com/office/drawing/2010/main" val="0"/>
+              </a:ext>
+            </a:extLst>
+          </a:blip>
+          <a:stretch>
+            <a:fillRect/>
+          </a:stretch>
+        </p:blipFill>
+        <p:spPr>
+          <a:xfrm>
+            <a:off x="9569039" y="706321"/>
+            <a:ext cx="2399734" cy="2399734"/>
+          </a:xfrm>
+          <a:prstGeom prst="rect">
+            <a:avLst/>
+          </a:prstGeom>
+        </p:spPr>
+      </p:pic>
+      <p:sp>
+        <p:nvSpPr>
+          <p:cNvPr id="25" name="TextBox 24"/>
           <p:cNvSpPr txBox="1"/>
           <p:nvPr/>
         </p:nvSpPr>
         <p:spPr>
           <a:xfrm>
-            <a:off x="449944" y="5138057"/>
-            <a:ext cx="1146628" cy="923330"/>
-          </a:xfrm>
-          <a:prstGeom prst="rect">
-            <a:avLst/>
-          </a:prstGeom>
-          <a:noFill/>
-        </p:spPr>
-        <p:txBody>
-          <a:bodyPr wrap="square" rtlCol="0">
-            <a:spAutoFit/>
-          </a:bodyPr>
-          <a:lstStyle/>
-          <a:p>
-            <a:r>
-              <a:rPr lang="en-US" smtClean="0"/>
-              <a:t>So sánh với Gauss filter</a:t>
-            </a:r>
-            <a:endParaRPr lang="en-US"/>
-          </a:p>
-        </p:txBody>
-      </p:sp>
-      <p:sp>
-        <p:nvSpPr>
-          <p:cNvPr id="12" name="TextBox 11"/>
-          <p:cNvSpPr txBox="1"/>
-          <p:nvPr/>
-        </p:nvSpPr>
-        <p:spPr>
-          <a:xfrm>
-            <a:off x="3439886" y="319314"/>
-            <a:ext cx="671979" cy="369332"/>
+            <a:off x="10238151" y="5722648"/>
+            <a:ext cx="1061509" cy="369332"/>
           </a:xfrm>
           <a:prstGeom prst="rect">
             <a:avLst/>
@@ -5074,22 +5611,22 @@
           <a:p>
             <a:r>
               <a:rPr lang="en-US" smtClean="0"/>
-              <a:t>N = 1</a:t>
-            </a:r>
-            <a:endParaRPr lang="en-US"/>
-          </a:p>
-        </p:txBody>
-      </p:sp>
-      <p:sp>
-        <p:nvSpPr>
-          <p:cNvPr id="13" name="TextBox 12"/>
+              <a:t>0.435408</a:t>
+            </a:r>
+            <a:endParaRPr lang="en-US"/>
+          </a:p>
+        </p:txBody>
+      </p:sp>
+      <p:sp>
+        <p:nvSpPr>
+          <p:cNvPr id="26" name="TextBox 25"/>
           <p:cNvSpPr txBox="1"/>
           <p:nvPr/>
         </p:nvSpPr>
         <p:spPr>
           <a:xfrm>
-            <a:off x="6504280" y="319314"/>
-            <a:ext cx="671979" cy="369332"/>
+            <a:off x="7682046" y="5722648"/>
+            <a:ext cx="1061509" cy="369332"/>
           </a:xfrm>
           <a:prstGeom prst="rect">
             <a:avLst/>
@@ -5104,22 +5641,22 @@
           <a:p>
             <a:r>
               <a:rPr lang="en-US" smtClean="0"/>
-              <a:t>N = 5</a:t>
-            </a:r>
-            <a:endParaRPr lang="en-US"/>
-          </a:p>
-        </p:txBody>
-      </p:sp>
-      <p:sp>
-        <p:nvSpPr>
-          <p:cNvPr id="14" name="TextBox 13"/>
+              <a:t>0.391192</a:t>
+            </a:r>
+            <a:endParaRPr lang="en-US"/>
+          </a:p>
+        </p:txBody>
+      </p:sp>
+      <p:sp>
+        <p:nvSpPr>
+          <p:cNvPr id="27" name="TextBox 26"/>
           <p:cNvSpPr txBox="1"/>
           <p:nvPr/>
         </p:nvSpPr>
         <p:spPr>
           <a:xfrm>
-            <a:off x="9416797" y="319314"/>
-            <a:ext cx="906017" cy="369332"/>
+            <a:off x="4976486" y="5722648"/>
+            <a:ext cx="1061509" cy="369332"/>
           </a:xfrm>
           <a:prstGeom prst="rect">
             <a:avLst/>
@@ -5134,7 +5671,67 @@
           <a:p>
             <a:r>
               <a:rPr lang="en-US" smtClean="0"/>
-              <a:t>N = 100</a:t>
+              <a:t>0.358988</a:t>
+            </a:r>
+            <a:endParaRPr lang="en-US"/>
+          </a:p>
+        </p:txBody>
+      </p:sp>
+      <p:sp>
+        <p:nvSpPr>
+          <p:cNvPr id="28" name="TextBox 27"/>
+          <p:cNvSpPr txBox="1"/>
+          <p:nvPr/>
+        </p:nvSpPr>
+        <p:spPr>
+          <a:xfrm>
+            <a:off x="2325714" y="5722648"/>
+            <a:ext cx="1061509" cy="369332"/>
+          </a:xfrm>
+          <a:prstGeom prst="rect">
+            <a:avLst/>
+          </a:prstGeom>
+          <a:noFill/>
+        </p:spPr>
+        <p:txBody>
+          <a:bodyPr wrap="none" rtlCol="0">
+            <a:spAutoFit/>
+          </a:bodyPr>
+          <a:lstStyle/>
+          <a:p>
+            <a:r>
+              <a:rPr lang="en-US" smtClean="0"/>
+              <a:t>0.426872</a:t>
+            </a:r>
+            <a:endParaRPr lang="en-US"/>
+          </a:p>
+        </p:txBody>
+      </p:sp>
+      <p:sp>
+        <p:nvSpPr>
+          <p:cNvPr id="29" name="TextBox 28"/>
+          <p:cNvSpPr txBox="1"/>
+          <p:nvPr/>
+        </p:nvSpPr>
+        <p:spPr>
+          <a:xfrm>
+            <a:off x="180823" y="5722648"/>
+            <a:ext cx="1340752" cy="369332"/>
+          </a:xfrm>
+          <a:prstGeom prst="rect">
+            <a:avLst/>
+          </a:prstGeom>
+          <a:noFill/>
+        </p:spPr>
+        <p:txBody>
+          <a:bodyPr wrap="none" rtlCol="0">
+            <a:spAutoFit/>
+          </a:bodyPr>
+          <a:lstStyle/>
+          <a:p>
+            <a:r>
+              <a:rPr lang="en-US" smtClean="0"/>
+              <a:t>Tỉ lệ pixel lỗi</a:t>
             </a:r>
             <a:endParaRPr lang="en-US"/>
           </a:p>
@@ -5150,6 +5747,13 @@
   <p:clrMapOvr>
     <a:masterClrMapping/>
   </p:clrMapOvr>
+  <p:timing>
+    <p:tnLst>
+      <p:par>
+        <p:cTn id="1" dur="indefinite" restart="never" nodeType="tmRoot"/>
+      </p:par>
+    </p:tnLst>
+  </p:timing>
 </p:sld>
 </file>
 
@@ -5187,30 +5791,66 @@
           <a:p>
             <a:r>
               <a:rPr lang="en-US" smtClean="0"/>
-              <a:t>Nhận xét</a:t>
-            </a:r>
-            <a:endParaRPr lang="en-US"/>
-          </a:p>
-        </p:txBody>
-      </p:sp>
-      <p:sp>
-        <p:nvSpPr>
-          <p:cNvPr id="3" name="Content Placeholder 2"/>
-          <p:cNvSpPr>
-            <a:spLocks noGrp="1"/>
-          </p:cNvSpPr>
+              <a:t>3. Subsampling</a:t>
+            </a:r>
+            <a:endParaRPr lang="en-US"/>
+          </a:p>
+        </p:txBody>
+      </p:sp>
+      <p:pic>
+        <p:nvPicPr>
+          <p:cNvPr id="4" name="Content Placeholder 3"/>
+          <p:cNvPicPr>
+            <a:picLocks noGrp="1" noChangeAspect="1"/>
+          </p:cNvPicPr>
           <p:nvPr>
             <p:ph idx="1"/>
           </p:nvPr>
-        </p:nvSpPr>
-        <p:spPr/>
-        <p:txBody>
-          <a:bodyPr/>
-          <a:lstStyle/>
-          <a:p>
-            <a:r>
-              <a:rPr lang="en-US" smtClean="0"/>
-              <a:t>N tăng, kết quả box filter gần hơn với Gauss filter</a:t>
+        </p:nvPicPr>
+        <p:blipFill>
+          <a:blip r:embed="rId2">
+            <a:extLst>
+              <a:ext uri="{28A0092B-C50C-407E-A947-70E740481C1C}">
+                <a14:useLocalDpi xmlns:a14="http://schemas.microsoft.com/office/drawing/2010/main" val="0"/>
+              </a:ext>
+            </a:extLst>
+          </a:blip>
+          <a:stretch>
+            <a:fillRect/>
+          </a:stretch>
+        </p:blipFill>
+        <p:spPr>
+          <a:xfrm>
+            <a:off x="3842544" y="1690688"/>
+            <a:ext cx="4506912" cy="4506912"/>
+          </a:xfrm>
+        </p:spPr>
+      </p:pic>
+      <p:sp>
+        <p:nvSpPr>
+          <p:cNvPr id="7" name="TextBox 6"/>
+          <p:cNvSpPr txBox="1"/>
+          <p:nvPr/>
+        </p:nvSpPr>
+        <p:spPr>
+          <a:xfrm>
+            <a:off x="5323352" y="6197600"/>
+            <a:ext cx="1545295" cy="369332"/>
+          </a:xfrm>
+          <a:prstGeom prst="rect">
+            <a:avLst/>
+          </a:prstGeom>
+          <a:noFill/>
+        </p:spPr>
+        <p:txBody>
+          <a:bodyPr wrap="none" rtlCol="0">
+            <a:spAutoFit/>
+          </a:bodyPr>
+          <a:lstStyle/>
+          <a:p>
+            <a:r>
+              <a:rPr lang="en-US" smtClean="0"/>
+              <a:t>Original Image</a:t>
             </a:r>
             <a:endParaRPr lang="en-US"/>
           </a:p>
@@ -5219,7 +5859,7 @@
     </p:spTree>
     <p:extLst>
       <p:ext uri="{BB962C8B-B14F-4D97-AF65-F5344CB8AC3E}">
-        <p14:creationId xmlns:p14="http://schemas.microsoft.com/office/powerpoint/2010/main" val="2307693100"/>
+        <p14:creationId xmlns:p14="http://schemas.microsoft.com/office/powerpoint/2010/main" val="1828680142"/>
       </p:ext>
     </p:extLst>
   </p:cSld>
@@ -5263,7 +5903,7 @@
           <a:p>
             <a:r>
               <a:rPr lang="en-US" smtClean="0"/>
-              <a:t>3. Subsampling</a:t>
+              <a:t>Subsampling 1:4 dùng nearest neighboor</a:t>
             </a:r>
             <a:endParaRPr lang="en-US"/>
           </a:p>
@@ -5293,11 +5933,106 @@
         </p:blipFill>
         <p:spPr>
           <a:xfrm>
-            <a:off x="3842544" y="1690688"/>
-            <a:ext cx="4506912" cy="4506912"/>
+            <a:off x="838200" y="1690688"/>
+            <a:ext cx="4347255" cy="4347255"/>
           </a:xfrm>
         </p:spPr>
       </p:pic>
+      <p:sp>
+        <p:nvSpPr>
+          <p:cNvPr id="5" name="Rectangle 4"/>
+          <p:cNvSpPr/>
+          <p:nvPr/>
+        </p:nvSpPr>
+        <p:spPr>
+          <a:xfrm>
+            <a:off x="6836228" y="1690688"/>
+            <a:ext cx="6096000" cy="3416320"/>
+          </a:xfrm>
+          <a:prstGeom prst="rect">
+            <a:avLst/>
+          </a:prstGeom>
+        </p:spPr>
+        <p:txBody>
+          <a:bodyPr>
+            <a:spAutoFit/>
+          </a:bodyPr>
+          <a:lstStyle/>
+          <a:p>
+            <a:r>
+              <a:rPr lang="en-US" smtClean="0"/>
+              <a:t>1	0	0</a:t>
+            </a:r>
+          </a:p>
+          <a:p>
+            <a:r>
+              <a:rPr lang="en-US" smtClean="0"/>
+              <a:t>0	0	0</a:t>
+            </a:r>
+          </a:p>
+          <a:p>
+            <a:r>
+              <a:rPr lang="en-US" smtClean="0"/>
+              <a:t>0	0	0</a:t>
+            </a:r>
+          </a:p>
+          <a:p>
+            <a:r>
+              <a:rPr lang="en-US" smtClean="0"/>
+              <a:t>0	0	0</a:t>
+            </a:r>
+          </a:p>
+          <a:p>
+            <a:r>
+              <a:rPr lang="en-US" smtClean="0"/>
+              <a:t>0	1	0</a:t>
+            </a:r>
+          </a:p>
+          <a:p>
+            <a:r>
+              <a:rPr lang="en-US" smtClean="0"/>
+              <a:t>0	0	0</a:t>
+            </a:r>
+          </a:p>
+          <a:p>
+            <a:r>
+              <a:rPr lang="en-US" smtClean="0"/>
+              <a:t>0	0	0</a:t>
+            </a:r>
+          </a:p>
+          <a:p>
+            <a:r>
+              <a:rPr lang="en-US" smtClean="0"/>
+              <a:t>0	0	0</a:t>
+            </a:r>
+          </a:p>
+          <a:p>
+            <a:r>
+              <a:rPr lang="en-US" smtClean="0"/>
+              <a:t>0	0	1</a:t>
+            </a:r>
+          </a:p>
+          <a:p>
+            <a:r>
+              <a:rPr lang="en-US" smtClean="0"/>
+              <a:t>0	0	0</a:t>
+            </a:r>
+          </a:p>
+          <a:p>
+            <a:r>
+              <a:rPr lang="en-US" smtClean="0"/>
+              <a:t>0	0	0</a:t>
+            </a:r>
+          </a:p>
+          <a:p>
+            <a:r>
+              <a:rPr lang="en-US" smtClean="0"/>
+              <a:t>0	0	0</a:t>
+            </a:r>
+            <a:endParaRPr lang="en-US"/>
+          </a:p>
+        </p:txBody>
+      </p:sp>
       <p:sp>
         <p:nvSpPr>
           <p:cNvPr id="7" name="TextBox 6"/>
@@ -5306,8 +6041,8 @@
         </p:nvSpPr>
         <p:spPr>
           <a:xfrm>
-            <a:off x="5323352" y="6197600"/>
-            <a:ext cx="1545295" cy="369332"/>
+            <a:off x="7184505" y="5476070"/>
+            <a:ext cx="1696362" cy="369332"/>
           </a:xfrm>
           <a:prstGeom prst="rect">
             <a:avLst/>
@@ -5322,7 +6057,7 @@
           <a:p>
             <a:r>
               <a:rPr lang="en-US" smtClean="0"/>
-              <a:t>Original Image</a:t>
+              <a:t>Ma trận Hx = Hy</a:t>
             </a:r>
             <a:endParaRPr lang="en-US"/>
           </a:p>
@@ -5331,7 +6066,7 @@
     </p:spTree>
     <p:extLst>
       <p:ext uri="{BB962C8B-B14F-4D97-AF65-F5344CB8AC3E}">
-        <p14:creationId xmlns:p14="http://schemas.microsoft.com/office/powerpoint/2010/main" val="1828680142"/>
+        <p14:creationId xmlns:p14="http://schemas.microsoft.com/office/powerpoint/2010/main" val="1945859918"/>
       </p:ext>
     </p:extLst>
   </p:cSld>

</xml_diff>